<commit_message>
Finalized some of the documentation, added to tree
</commit_message>
<xml_diff>
--- a/docs/Brossard_CapstonePresentation.pptx
+++ b/docs/Brossard_CapstonePresentation.pptx
@@ -207,7 +207,8 @@
           <a:p>
             <a:fld id="{A98764CA-10AC-4400-99EA-55944C4A73C5}" type="datetimeFigureOut">
               <a:rPr lang="en-US" smtClean="0"/>
-              <a:t>6/28/2010</a:t>
+              <a:pPr/>
+              <a:t>6/30/2010</a:t>
             </a:fld>
             <a:endParaRPr lang="en-US" dirty="0"/>
           </a:p>
@@ -273,6 +274,7 @@
           <a:p>
             <a:fld id="{38C16A32-76C7-4EE4-A7BA-7328638A4477}" type="slidenum">
               <a:rPr lang="en-US" smtClean="0"/>
+              <a:pPr/>
               <a:t>‹#›</a:t>
             </a:fld>
             <a:endParaRPr lang="en-US" dirty="0"/>
@@ -367,7 +369,8 @@
           <a:p>
             <a:fld id="{79CF8500-1F06-4D69-AAFF-E889BD3F3DCA}" type="datetimeFigureOut">
               <a:rPr lang="en-US" smtClean="0"/>
-              <a:t>6/28/2010</a:t>
+              <a:pPr/>
+              <a:t>6/30/2010</a:t>
             </a:fld>
             <a:endParaRPr lang="en-US" dirty="0"/>
           </a:p>
@@ -528,6 +531,7 @@
           <a:p>
             <a:fld id="{F07E14E4-26C3-4753-9F6A-15AEAA4C86E9}" type="slidenum">
               <a:rPr lang="en-US" smtClean="0"/>
+              <a:pPr/>
               <a:t>‹#›</a:t>
             </a:fld>
             <a:endParaRPr lang="en-US" dirty="0"/>
@@ -699,6 +703,7 @@
           <a:p>
             <a:fld id="{F07E14E4-26C3-4753-9F6A-15AEAA4C86E9}" type="slidenum">
               <a:rPr lang="en-US" smtClean="0"/>
+              <a:pPr/>
               <a:t>1</a:t>
             </a:fld>
             <a:endParaRPr lang="en-US" dirty="0"/>
@@ -790,6 +795,7 @@
           <a:p>
             <a:fld id="{F07E14E4-26C3-4753-9F6A-15AEAA4C86E9}" type="slidenum">
               <a:rPr lang="en-US" smtClean="0"/>
+              <a:pPr/>
               <a:t>2</a:t>
             </a:fld>
             <a:endParaRPr lang="en-US" dirty="0"/>
@@ -871,6 +877,7 @@
           <a:p>
             <a:fld id="{F07E14E4-26C3-4753-9F6A-15AEAA4C86E9}" type="slidenum">
               <a:rPr lang="en-US" smtClean="0"/>
+              <a:pPr/>
               <a:t>4</a:t>
             </a:fld>
             <a:endParaRPr lang="en-US" dirty="0"/>
@@ -952,6 +959,7 @@
           <a:p>
             <a:fld id="{F07E14E4-26C3-4753-9F6A-15AEAA4C86E9}" type="slidenum">
               <a:rPr lang="en-US" smtClean="0"/>
+              <a:pPr/>
               <a:t>5</a:t>
             </a:fld>
             <a:endParaRPr lang="en-US" dirty="0"/>
@@ -1033,6 +1041,7 @@
           <a:p>
             <a:fld id="{F07E14E4-26C3-4753-9F6A-15AEAA4C86E9}" type="slidenum">
               <a:rPr lang="en-US" smtClean="0"/>
+              <a:pPr/>
               <a:t>6</a:t>
             </a:fld>
             <a:endParaRPr lang="en-US" dirty="0"/>
@@ -1114,6 +1123,7 @@
           <a:p>
             <a:fld id="{F07E14E4-26C3-4753-9F6A-15AEAA4C86E9}" type="slidenum">
               <a:rPr lang="en-US" smtClean="0"/>
+              <a:pPr/>
               <a:t>7</a:t>
             </a:fld>
             <a:endParaRPr lang="en-US" dirty="0"/>
@@ -1195,6 +1205,7 @@
           <a:p>
             <a:fld id="{F07E14E4-26C3-4753-9F6A-15AEAA4C86E9}" type="slidenum">
               <a:rPr lang="en-US" smtClean="0"/>
+              <a:pPr/>
               <a:t>11</a:t>
             </a:fld>
             <a:endParaRPr lang="en-US" dirty="0"/>
@@ -1398,7 +1409,7 @@
             <a:fld id="{D18B5378-FACF-44B0-AC99-8AC4DAC03B83}" type="datetime4">
               <a:rPr lang="en-US" smtClean="0"/>
               <a:pPr/>
-              <a:t>June 28, 2010</a:t>
+              <a:t>June 30, 2010</a:t>
             </a:fld>
             <a:endParaRPr lang="en-US" dirty="0"/>
           </a:p>
@@ -1565,7 +1576,7 @@
             <a:fld id="{8CC6C3A0-AA72-49CC-95E4-196065DBA5DC}" type="datetime4">
               <a:rPr lang="en-US" smtClean="0"/>
               <a:pPr/>
-              <a:t>June 28, 2010</a:t>
+              <a:t>June 30, 2010</a:t>
             </a:fld>
             <a:endParaRPr lang="en-US" dirty="0"/>
           </a:p>
@@ -1868,7 +1879,7 @@
             <a:fld id="{DF09F995-2EBB-402F-9195-64F00BABB6B9}" type="datetime4">
               <a:rPr lang="en-US" smtClean="0"/>
               <a:pPr/>
-              <a:t>June 28, 2010</a:t>
+              <a:t>June 30, 2010</a:t>
             </a:fld>
             <a:endParaRPr lang="en-US" dirty="0"/>
           </a:p>
@@ -2094,7 +2105,7 @@
             <a:fld id="{7078147F-189F-4FFA-A267-369D34AB584A}" type="datetime4">
               <a:rPr lang="en-US" smtClean="0"/>
               <a:pPr/>
-              <a:t>June 28, 2010</a:t>
+              <a:t>June 30, 2010</a:t>
             </a:fld>
             <a:endParaRPr lang="en-US" dirty="0"/>
           </a:p>
@@ -2339,7 +2350,7 @@
             <a:fld id="{51C183AE-9AD8-46D5-874E-60D4A6970565}" type="datetime4">
               <a:rPr lang="en-US" smtClean="0"/>
               <a:pPr/>
-              <a:t>June 28, 2010</a:t>
+              <a:t>June 30, 2010</a:t>
             </a:fld>
             <a:endParaRPr lang="en-US" dirty="0"/>
           </a:p>
@@ -2573,7 +2584,7 @@
             <a:fld id="{89AC96ED-90D1-4C2C-BE67-1B455005EE39}" type="datetime4">
               <a:rPr lang="en-US" smtClean="0"/>
               <a:pPr/>
-              <a:t>June 28, 2010</a:t>
+              <a:t>June 30, 2010</a:t>
             </a:fld>
             <a:endParaRPr lang="en-US" dirty="0"/>
           </a:p>
@@ -2945,7 +2956,7 @@
             <a:fld id="{70EBDF3F-7F03-4990-88EB-58127F30DD01}" type="datetime4">
               <a:rPr lang="en-US" smtClean="0"/>
               <a:pPr/>
-              <a:t>June 28, 2010</a:t>
+              <a:t>June 30, 2010</a:t>
             </a:fld>
             <a:endParaRPr lang="en-US" dirty="0"/>
           </a:p>
@@ -3065,7 +3076,7 @@
             <a:fld id="{8FEEA5EA-0B3C-45C7-93F5-09A69215F3FC}" type="datetime4">
               <a:rPr lang="en-US" smtClean="0"/>
               <a:pPr/>
-              <a:t>June 28, 2010</a:t>
+              <a:t>June 30, 2010</a:t>
             </a:fld>
             <a:endParaRPr lang="en-US" dirty="0"/>
           </a:p>
@@ -3157,7 +3168,7 @@
             <a:fld id="{DFC492AC-1C5B-4DA0-B959-2243B380DA0E}" type="datetime4">
               <a:rPr lang="en-US" smtClean="0"/>
               <a:pPr/>
-              <a:t>June 28, 2010</a:t>
+              <a:t>June 30, 2010</a:t>
             </a:fld>
             <a:endParaRPr lang="en-US" dirty="0"/>
           </a:p>
@@ -3409,7 +3420,7 @@
             <a:fld id="{64F1F188-69E7-491E-AF52-6352FE9B2C64}" type="datetime4">
               <a:rPr lang="en-US" smtClean="0"/>
               <a:pPr/>
-              <a:t>June 28, 2010</a:t>
+              <a:t>June 30, 2010</a:t>
             </a:fld>
             <a:endParaRPr lang="en-US" dirty="0"/>
           </a:p>
@@ -3501,7 +3512,7 @@
             <a:fld id="{4B0DAF0F-35C9-4DB2-B503-DAAC36D2EE47}" type="datetime4">
               <a:rPr lang="en-US" smtClean="0"/>
               <a:pPr/>
-              <a:t>June 28, 2010</a:t>
+              <a:t>June 30, 2010</a:t>
             </a:fld>
             <a:endParaRPr lang="en-US" dirty="0"/>
           </a:p>
@@ -4037,7 +4048,7 @@
             <a:fld id="{8AEC8A13-5372-40ED-8084-1C5B7C7AD349}" type="datetime4">
               <a:rPr lang="en-US" smtClean="0"/>
               <a:pPr/>
-              <a:t>June 28, 2010</a:t>
+              <a:t>June 30, 2010</a:t>
             </a:fld>
             <a:endParaRPr lang="en-US" dirty="0"/>
           </a:p>
@@ -4691,7 +4702,6 @@
               <a:rPr lang="en-US" dirty="0" smtClean="0"/>
               <a:t>Sharp Architecture Lite further separates data access from core objects</a:t>
             </a:r>
-            <a:endParaRPr lang="en-US" dirty="0" smtClean="0"/>
           </a:p>
           <a:p>
             <a:r>
@@ -4705,7 +4715,6 @@
               <a:rPr lang="en-US" dirty="0" smtClean="0"/>
               <a:t>Test-Driven Development tools in Sharp Architecture Lite</a:t>
             </a:r>
-            <a:endParaRPr lang="en-US" dirty="0" smtClean="0"/>
           </a:p>
           <a:p>
             <a:pPr lvl="1"/>
@@ -4713,7 +4722,6 @@
               <a:rPr lang="en-US" dirty="0" smtClean="0"/>
               <a:t>Castle Winsor dependency inversion allows MVC Controllers to be tested in isolation</a:t>
             </a:r>
-            <a:endParaRPr lang="en-US" dirty="0" smtClean="0"/>
           </a:p>
           <a:p>
             <a:pPr lvl="1"/>
@@ -4725,11 +4733,7 @@
           <a:p>
             <a:r>
               <a:rPr lang="en-US" dirty="0" smtClean="0"/>
-              <a:t>Convention </a:t>
-            </a:r>
-            <a:r>
-              <a:rPr lang="en-US" dirty="0" smtClean="0"/>
-              <a:t>over Configuration</a:t>
+              <a:t>Convention over Configuration</a:t>
             </a:r>
           </a:p>
           <a:p>
@@ -4745,7 +4749,6 @@
               <a:rPr lang="en-US" dirty="0" smtClean="0"/>
               <a:t>NHibernate ORM primarily uses auto-mapped conventions from database</a:t>
             </a:r>
-            <a:endParaRPr lang="en-US" dirty="0" smtClean="0"/>
           </a:p>
           <a:p>
             <a:pPr lvl="1"/>
@@ -5236,8 +5239,17 @@
             <a:pPr lvl="1"/>
             <a:r>
               <a:rPr lang="en-US" dirty="0" smtClean="0"/>
-              <a:t>Provides a non-eBay branded web property where more complete product listings, details, or store information can hosted</a:t>
-            </a:r>
+              <a:t>Provides a non-eBay branded web property where more complete product listings, details, or store information </a:t>
+            </a:r>
+            <a:r>
+              <a:rPr lang="en-US" smtClean="0"/>
+              <a:t>can </a:t>
+            </a:r>
+            <a:r>
+              <a:rPr lang="en-US" smtClean="0"/>
+              <a:t>be hosted</a:t>
+            </a:r>
+            <a:endParaRPr lang="en-US" dirty="0" smtClean="0"/>
           </a:p>
           <a:p>
             <a:pPr lvl="1"/>
@@ -5252,11 +5264,7 @@
           <a:p>
             <a:r>
               <a:rPr lang="en-US" dirty="0" smtClean="0"/>
-              <a:t>Project </a:t>
-            </a:r>
-            <a:r>
-              <a:rPr lang="en-US" dirty="0" smtClean="0"/>
-              <a:t>Goals</a:t>
+              <a:t>Project Goals</a:t>
             </a:r>
           </a:p>
           <a:p>
@@ -5546,11 +5554,7 @@
           <a:p>
             <a:r>
               <a:rPr lang="en-US" dirty="0" smtClean="0"/>
-              <a:t>Amazon </a:t>
-            </a:r>
-            <a:r>
-              <a:rPr lang="en-US" dirty="0" smtClean="0"/>
-              <a:t>EC2</a:t>
+              <a:t>Amazon EC2</a:t>
             </a:r>
           </a:p>
           <a:p>
@@ -5559,7 +5563,6 @@
               <a:rPr lang="en-US" dirty="0" smtClean="0"/>
               <a:t>Infrastructure-as-a-Service model, major negative: more network administration necessary</a:t>
             </a:r>
-            <a:endParaRPr lang="en-US" dirty="0" smtClean="0"/>
           </a:p>
           <a:p>
             <a:endParaRPr lang="en-US" dirty="0" smtClean="0"/>
@@ -5918,15 +5921,7 @@
             <a:pPr lvl="1"/>
             <a:r>
               <a:rPr lang="en-US" dirty="0" smtClean="0"/>
-              <a:t>Each component should </a:t>
-            </a:r>
-            <a:r>
-              <a:rPr lang="en-US" dirty="0" smtClean="0"/>
-              <a:t>have a single responsibility, and that responsibility should be entirely </a:t>
-            </a:r>
-            <a:r>
-              <a:rPr lang="en-US" dirty="0" smtClean="0"/>
-              <a:t>encapsulated</a:t>
+              <a:t>Each component should have a single responsibility, and that responsibility should be entirely encapsulated</a:t>
             </a:r>
           </a:p>
           <a:p>
@@ -6257,7 +6252,6 @@
               <a:rPr lang="en-US" dirty="0" smtClean="0"/>
               <a:t>Mocking with Rhino Mocks</a:t>
             </a:r>
-            <a:endParaRPr lang="en-US" dirty="0" smtClean="0"/>
           </a:p>
           <a:p>
             <a:pPr lvl="1"/>

</xml_diff>